<commit_message>
player section added, scaling for active player
</commit_message>
<xml_diff>
--- a/Präsentation1.pptx
+++ b/Präsentation1.pptx
@@ -6,6 +6,8 @@
   </p:sldMasterIdLst>
   <p:sldIdLst>
     <p:sldId id="256" r:id="rId2"/>
+    <p:sldId id="258" r:id="rId3"/>
+    <p:sldId id="257" r:id="rId4"/>
   </p:sldIdLst>
   <p:sldSz cx="12192000" cy="6858000"/>
   <p:notesSz cx="6858000" cy="9144000"/>
@@ -259,7 +261,7 @@
           <a:p>
             <a:fld id="{271F8653-EF1E-4EF8-B2E3-B053A163D7FA}" type="datetimeFigureOut">
               <a:rPr lang="de-DE" smtClean="0"/>
-              <a:t>09.04.2022</a:t>
+              <a:t>15.04.2022</a:t>
             </a:fld>
             <a:endParaRPr lang="de-DE"/>
           </a:p>
@@ -457,7 +459,7 @@
           <a:p>
             <a:fld id="{271F8653-EF1E-4EF8-B2E3-B053A163D7FA}" type="datetimeFigureOut">
               <a:rPr lang="de-DE" smtClean="0"/>
-              <a:t>09.04.2022</a:t>
+              <a:t>15.04.2022</a:t>
             </a:fld>
             <a:endParaRPr lang="de-DE"/>
           </a:p>
@@ -665,7 +667,7 @@
           <a:p>
             <a:fld id="{271F8653-EF1E-4EF8-B2E3-B053A163D7FA}" type="datetimeFigureOut">
               <a:rPr lang="de-DE" smtClean="0"/>
-              <a:t>09.04.2022</a:t>
+              <a:t>15.04.2022</a:t>
             </a:fld>
             <a:endParaRPr lang="de-DE"/>
           </a:p>
@@ -863,7 +865,7 @@
           <a:p>
             <a:fld id="{271F8653-EF1E-4EF8-B2E3-B053A163D7FA}" type="datetimeFigureOut">
               <a:rPr lang="de-DE" smtClean="0"/>
-              <a:t>09.04.2022</a:t>
+              <a:t>15.04.2022</a:t>
             </a:fld>
             <a:endParaRPr lang="de-DE"/>
           </a:p>
@@ -1138,7 +1140,7 @@
           <a:p>
             <a:fld id="{271F8653-EF1E-4EF8-B2E3-B053A163D7FA}" type="datetimeFigureOut">
               <a:rPr lang="de-DE" smtClean="0"/>
-              <a:t>09.04.2022</a:t>
+              <a:t>15.04.2022</a:t>
             </a:fld>
             <a:endParaRPr lang="de-DE"/>
           </a:p>
@@ -1403,7 +1405,7 @@
           <a:p>
             <a:fld id="{271F8653-EF1E-4EF8-B2E3-B053A163D7FA}" type="datetimeFigureOut">
               <a:rPr lang="de-DE" smtClean="0"/>
-              <a:t>09.04.2022</a:t>
+              <a:t>15.04.2022</a:t>
             </a:fld>
             <a:endParaRPr lang="de-DE"/>
           </a:p>
@@ -1815,7 +1817,7 @@
           <a:p>
             <a:fld id="{271F8653-EF1E-4EF8-B2E3-B053A163D7FA}" type="datetimeFigureOut">
               <a:rPr lang="de-DE" smtClean="0"/>
-              <a:t>09.04.2022</a:t>
+              <a:t>15.04.2022</a:t>
             </a:fld>
             <a:endParaRPr lang="de-DE"/>
           </a:p>
@@ -1956,7 +1958,7 @@
           <a:p>
             <a:fld id="{271F8653-EF1E-4EF8-B2E3-B053A163D7FA}" type="datetimeFigureOut">
               <a:rPr lang="de-DE" smtClean="0"/>
-              <a:t>09.04.2022</a:t>
+              <a:t>15.04.2022</a:t>
             </a:fld>
             <a:endParaRPr lang="de-DE"/>
           </a:p>
@@ -2069,7 +2071,7 @@
           <a:p>
             <a:fld id="{271F8653-EF1E-4EF8-B2E3-B053A163D7FA}" type="datetimeFigureOut">
               <a:rPr lang="de-DE" smtClean="0"/>
-              <a:t>09.04.2022</a:t>
+              <a:t>15.04.2022</a:t>
             </a:fld>
             <a:endParaRPr lang="de-DE"/>
           </a:p>
@@ -2380,7 +2382,7 @@
           <a:p>
             <a:fld id="{271F8653-EF1E-4EF8-B2E3-B053A163D7FA}" type="datetimeFigureOut">
               <a:rPr lang="de-DE" smtClean="0"/>
-              <a:t>09.04.2022</a:t>
+              <a:t>15.04.2022</a:t>
             </a:fld>
             <a:endParaRPr lang="de-DE"/>
           </a:p>
@@ -2668,7 +2670,7 @@
           <a:p>
             <a:fld id="{271F8653-EF1E-4EF8-B2E3-B053A163D7FA}" type="datetimeFigureOut">
               <a:rPr lang="de-DE" smtClean="0"/>
-              <a:t>09.04.2022</a:t>
+              <a:t>15.04.2022</a:t>
             </a:fld>
             <a:endParaRPr lang="de-DE"/>
           </a:p>
@@ -2909,7 +2911,7 @@
           <a:p>
             <a:fld id="{271F8653-EF1E-4EF8-B2E3-B053A163D7FA}" type="datetimeFigureOut">
               <a:rPr lang="de-DE" smtClean="0"/>
-              <a:t>09.04.2022</a:t>
+              <a:t>15.04.2022</a:t>
             </a:fld>
             <a:endParaRPr lang="de-DE"/>
           </a:p>
@@ -3627,6 +3629,402 @@
 </p:sld>
 </file>
 
+<file path=ppt/slides/slide2.xml><?xml version="1.0" encoding="utf-8"?>
+<p:sld xmlns:a="http://schemas.openxmlformats.org/drawingml/2006/main" xmlns:r="http://schemas.openxmlformats.org/officeDocument/2006/relationships" xmlns:p="http://schemas.openxmlformats.org/presentationml/2006/main">
+  <p:cSld>
+    <p:spTree>
+      <p:nvGrpSpPr>
+        <p:cNvPr id="1" name=""/>
+        <p:cNvGrpSpPr/>
+        <p:nvPr/>
+      </p:nvGrpSpPr>
+      <p:grpSpPr>
+        <a:xfrm>
+          <a:off x="0" y="0"/>
+          <a:ext cx="0" cy="0"/>
+          <a:chOff x="0" y="0"/>
+          <a:chExt cx="0" cy="0"/>
+        </a:xfrm>
+      </p:grpSpPr>
+      <p:grpSp>
+        <p:nvGrpSpPr>
+          <p:cNvPr id="5" name="Gruppieren 4">
+            <a:extLst>
+              <a:ext uri="{FF2B5EF4-FFF2-40B4-BE49-F238E27FC236}">
+                <a16:creationId xmlns:a16="http://schemas.microsoft.com/office/drawing/2014/main" id="{E0CA4395-6029-472D-A9F1-3B34B28564D0}"/>
+              </a:ext>
+            </a:extLst>
+          </p:cNvPr>
+          <p:cNvGrpSpPr/>
+          <p:nvPr/>
+        </p:nvGrpSpPr>
+        <p:grpSpPr>
+          <a:xfrm>
+            <a:off x="2364308" y="1828800"/>
+            <a:ext cx="2456170" cy="2317172"/>
+            <a:chOff x="2364308" y="1828800"/>
+            <a:chExt cx="2428074" cy="2317172"/>
+          </a:xfrm>
+        </p:grpSpPr>
+        <p:pic>
+          <p:nvPicPr>
+            <p:cNvPr id="2" name="Grafik 1" descr="Ein Bild, das dunkel enthält.&#10;&#10;Automatisch generierte Beschreibung">
+              <a:extLst>
+                <a:ext uri="{FF2B5EF4-FFF2-40B4-BE49-F238E27FC236}">
+                  <a16:creationId xmlns:a16="http://schemas.microsoft.com/office/drawing/2014/main" id="{2FD68DBB-AE46-4CC6-99A9-05A78A640507}"/>
+                </a:ext>
+              </a:extLst>
+            </p:cNvPr>
+            <p:cNvPicPr>
+              <a:picLocks noChangeAspect="1"/>
+            </p:cNvPicPr>
+            <p:nvPr/>
+          </p:nvPicPr>
+          <p:blipFill rotWithShape="1">
+            <a:blip r:embed="rId2">
+              <a:extLst>
+                <a:ext uri="{28A0092B-C50C-407E-A947-70E740481C1C}">
+                  <a14:useLocalDpi xmlns:a14="http://schemas.microsoft.com/office/drawing/2010/main" val="0"/>
+                </a:ext>
+              </a:extLst>
+            </a:blip>
+            <a:srcRect t="12892" b="-9704"/>
+            <a:stretch/>
+          </p:blipFill>
+          <p:spPr>
+            <a:xfrm>
+              <a:off x="2364308" y="1828800"/>
+              <a:ext cx="2428074" cy="2317172"/>
+            </a:xfrm>
+            <a:prstGeom prst="rect">
+              <a:avLst/>
+            </a:prstGeom>
+          </p:spPr>
+        </p:pic>
+        <p:sp>
+          <p:nvSpPr>
+            <p:cNvPr id="4" name="Textfeld 3">
+              <a:extLst>
+                <a:ext uri="{FF2B5EF4-FFF2-40B4-BE49-F238E27FC236}">
+                  <a16:creationId xmlns:a16="http://schemas.microsoft.com/office/drawing/2014/main" id="{AE1930C5-2CD7-4117-9669-3FA4B9B4A3E4}"/>
+                </a:ext>
+              </a:extLst>
+            </p:cNvPr>
+            <p:cNvSpPr txBox="1"/>
+            <p:nvPr/>
+          </p:nvSpPr>
+          <p:spPr>
+            <a:xfrm>
+              <a:off x="2868982" y="2518148"/>
+              <a:ext cx="1418726" cy="646331"/>
+            </a:xfrm>
+            <a:prstGeom prst="rect">
+              <a:avLst/>
+            </a:prstGeom>
+            <a:noFill/>
+          </p:spPr>
+          <p:txBody>
+            <a:bodyPr wrap="square">
+              <a:spAutoFit/>
+            </a:bodyPr>
+            <a:lstStyle/>
+            <a:p>
+              <a:pPr algn="ctr"/>
+              <a:r>
+                <a:rPr lang="de-DE" sz="3600" dirty="0" err="1">
+                  <a:solidFill>
+                    <a:schemeClr val="bg1"/>
+                  </a:solidFill>
+                  <a:latin typeface="Matura MT Script Capitals" panose="03020802060602070202" pitchFamily="66" charset="0"/>
+                  <a:cs typeface="Arial" panose="020B0604020202020204" pitchFamily="34" charset="0"/>
+                </a:rPr>
+                <a:t>RoF</a:t>
+              </a:r>
+              <a:endParaRPr lang="de-DE" sz="3600" dirty="0">
+                <a:solidFill>
+                  <a:schemeClr val="bg1"/>
+                </a:solidFill>
+                <a:latin typeface="Matura MT Script Capitals" panose="03020802060602070202" pitchFamily="66" charset="0"/>
+                <a:cs typeface="Arial" panose="020B0604020202020204" pitchFamily="34" charset="0"/>
+              </a:endParaRPr>
+            </a:p>
+          </p:txBody>
+        </p:sp>
+      </p:grpSp>
+    </p:spTree>
+    <p:extLst>
+      <p:ext uri="{BB962C8B-B14F-4D97-AF65-F5344CB8AC3E}">
+        <p14:creationId xmlns:p14="http://schemas.microsoft.com/office/powerpoint/2010/main" val="4149771209"/>
+      </p:ext>
+    </p:extLst>
+  </p:cSld>
+  <p:clrMapOvr>
+    <a:masterClrMapping/>
+  </p:clrMapOvr>
+</p:sld>
+</file>
+
+<file path=ppt/slides/slide3.xml><?xml version="1.0" encoding="utf-8"?>
+<p:sld xmlns:a="http://schemas.openxmlformats.org/drawingml/2006/main" xmlns:r="http://schemas.openxmlformats.org/officeDocument/2006/relationships" xmlns:p="http://schemas.openxmlformats.org/presentationml/2006/main">
+  <p:cSld>
+    <p:spTree>
+      <p:nvGrpSpPr>
+        <p:cNvPr id="1" name=""/>
+        <p:cNvGrpSpPr/>
+        <p:nvPr/>
+      </p:nvGrpSpPr>
+      <p:grpSpPr>
+        <a:xfrm>
+          <a:off x="0" y="0"/>
+          <a:ext cx="0" cy="0"/>
+          <a:chOff x="0" y="0"/>
+          <a:chExt cx="0" cy="0"/>
+        </a:xfrm>
+      </p:grpSpPr>
+      <p:grpSp>
+        <p:nvGrpSpPr>
+          <p:cNvPr id="7" name="Gruppieren 6">
+            <a:extLst>
+              <a:ext uri="{FF2B5EF4-FFF2-40B4-BE49-F238E27FC236}">
+                <a16:creationId xmlns:a16="http://schemas.microsoft.com/office/drawing/2014/main" id="{CEA4F806-73D8-49B3-8864-F0C21B96F1BF}"/>
+              </a:ext>
+            </a:extLst>
+          </p:cNvPr>
+          <p:cNvGrpSpPr/>
+          <p:nvPr/>
+        </p:nvGrpSpPr>
+        <p:grpSpPr>
+          <a:xfrm>
+            <a:off x="1886464" y="815546"/>
+            <a:ext cx="3810000" cy="5532120"/>
+            <a:chOff x="1886464" y="815546"/>
+            <a:chExt cx="3810000" cy="5532120"/>
+          </a:xfrm>
+        </p:grpSpPr>
+        <p:sp>
+          <p:nvSpPr>
+            <p:cNvPr id="2" name="Rechteck: abgerundete Ecken 1">
+              <a:extLst>
+                <a:ext uri="{FF2B5EF4-FFF2-40B4-BE49-F238E27FC236}">
+                  <a16:creationId xmlns:a16="http://schemas.microsoft.com/office/drawing/2014/main" id="{F90377C3-4C18-4ABD-BB1A-23786D7683DE}"/>
+                </a:ext>
+              </a:extLst>
+            </p:cNvPr>
+            <p:cNvSpPr/>
+            <p:nvPr/>
+          </p:nvSpPr>
+          <p:spPr>
+            <a:xfrm>
+              <a:off x="1886464" y="815546"/>
+              <a:ext cx="3810000" cy="5532120"/>
+            </a:xfrm>
+            <a:prstGeom prst="roundRect">
+              <a:avLst/>
+            </a:prstGeom>
+            <a:solidFill>
+              <a:srgbClr val="B42229"/>
+            </a:solidFill>
+          </p:spPr>
+          <p:style>
+            <a:lnRef idx="2">
+              <a:schemeClr val="accent1">
+                <a:shade val="50000"/>
+              </a:schemeClr>
+            </a:lnRef>
+            <a:fillRef idx="1">
+              <a:schemeClr val="accent1"/>
+            </a:fillRef>
+            <a:effectRef idx="0">
+              <a:schemeClr val="accent1"/>
+            </a:effectRef>
+            <a:fontRef idx="minor">
+              <a:schemeClr val="lt1"/>
+            </a:fontRef>
+          </p:style>
+          <p:txBody>
+            <a:bodyPr rtlCol="0" anchor="ctr"/>
+            <a:lstStyle/>
+            <a:p>
+              <a:pPr algn="ctr"/>
+              <a:endParaRPr lang="de-DE" dirty="0"/>
+            </a:p>
+          </p:txBody>
+        </p:sp>
+        <p:sp>
+          <p:nvSpPr>
+            <p:cNvPr id="3" name="Rechteck: abgerundete Ecken 2">
+              <a:extLst>
+                <a:ext uri="{FF2B5EF4-FFF2-40B4-BE49-F238E27FC236}">
+                  <a16:creationId xmlns:a16="http://schemas.microsoft.com/office/drawing/2014/main" id="{A4D6D50B-AAE3-417F-9569-4B10EDD2BB77}"/>
+                </a:ext>
+              </a:extLst>
+            </p:cNvPr>
+            <p:cNvSpPr/>
+            <p:nvPr/>
+          </p:nvSpPr>
+          <p:spPr>
+            <a:xfrm>
+              <a:off x="2151508" y="1017311"/>
+              <a:ext cx="3279913" cy="5128591"/>
+            </a:xfrm>
+            <a:prstGeom prst="roundRect">
+              <a:avLst/>
+            </a:prstGeom>
+            <a:noFill/>
+            <a:ln w="38100">
+              <a:solidFill>
+                <a:schemeClr val="bg1"/>
+              </a:solidFill>
+            </a:ln>
+          </p:spPr>
+          <p:style>
+            <a:lnRef idx="2">
+              <a:schemeClr val="accent1">
+                <a:shade val="50000"/>
+              </a:schemeClr>
+            </a:lnRef>
+            <a:fillRef idx="1">
+              <a:schemeClr val="accent1"/>
+            </a:fillRef>
+            <a:effectRef idx="0">
+              <a:schemeClr val="accent1"/>
+            </a:effectRef>
+            <a:fontRef idx="minor">
+              <a:schemeClr val="lt1"/>
+            </a:fontRef>
+          </p:style>
+          <p:txBody>
+            <a:bodyPr rtlCol="0" anchor="ctr"/>
+            <a:lstStyle/>
+            <a:p>
+              <a:pPr algn="ctr"/>
+              <a:endParaRPr lang="de-DE"/>
+            </a:p>
+          </p:txBody>
+        </p:sp>
+        <p:sp>
+          <p:nvSpPr>
+            <p:cNvPr id="4" name="Rechteck: abgerundete Ecken 3">
+              <a:extLst>
+                <a:ext uri="{FF2B5EF4-FFF2-40B4-BE49-F238E27FC236}">
+                  <a16:creationId xmlns:a16="http://schemas.microsoft.com/office/drawing/2014/main" id="{D7899317-A096-4660-B959-1C2BAEF3ACBD}"/>
+                </a:ext>
+              </a:extLst>
+            </p:cNvPr>
+            <p:cNvSpPr/>
+            <p:nvPr/>
+          </p:nvSpPr>
+          <p:spPr>
+            <a:xfrm>
+              <a:off x="2350290" y="1196484"/>
+              <a:ext cx="2882348" cy="4770245"/>
+            </a:xfrm>
+            <a:prstGeom prst="roundRect">
+              <a:avLst/>
+            </a:prstGeom>
+            <a:blipFill>
+              <a:blip r:embed="rId2"/>
+              <a:stretch>
+                <a:fillRect/>
+              </a:stretch>
+            </a:blipFill>
+            <a:ln w="12700">
+              <a:solidFill>
+                <a:schemeClr val="bg1"/>
+              </a:solidFill>
+            </a:ln>
+          </p:spPr>
+          <p:style>
+            <a:lnRef idx="2">
+              <a:schemeClr val="accent1">
+                <a:shade val="50000"/>
+              </a:schemeClr>
+            </a:lnRef>
+            <a:fillRef idx="1">
+              <a:schemeClr val="accent1"/>
+            </a:fillRef>
+            <a:effectRef idx="0">
+              <a:schemeClr val="accent1"/>
+            </a:effectRef>
+            <a:fontRef idx="minor">
+              <a:schemeClr val="lt1"/>
+            </a:fontRef>
+          </p:style>
+          <p:txBody>
+            <a:bodyPr rtlCol="0" anchor="ctr"/>
+            <a:lstStyle/>
+            <a:p>
+              <a:pPr algn="ctr"/>
+              <a:endParaRPr lang="de-DE"/>
+            </a:p>
+          </p:txBody>
+        </p:sp>
+        <p:sp>
+          <p:nvSpPr>
+            <p:cNvPr id="5" name="Rechteck: abgerundete Ecken 4">
+              <a:extLst>
+                <a:ext uri="{FF2B5EF4-FFF2-40B4-BE49-F238E27FC236}">
+                  <a16:creationId xmlns:a16="http://schemas.microsoft.com/office/drawing/2014/main" id="{C375D1F2-AC5B-4444-B4E7-7699CA73EFEF}"/>
+                </a:ext>
+              </a:extLst>
+            </p:cNvPr>
+            <p:cNvSpPr/>
+            <p:nvPr/>
+          </p:nvSpPr>
+          <p:spPr>
+            <a:xfrm>
+              <a:off x="2151508" y="1017311"/>
+              <a:ext cx="3279913" cy="5128591"/>
+            </a:xfrm>
+            <a:prstGeom prst="roundRect">
+              <a:avLst/>
+            </a:prstGeom>
+            <a:noFill/>
+            <a:ln w="38100">
+              <a:solidFill>
+                <a:schemeClr val="bg1"/>
+              </a:solidFill>
+            </a:ln>
+          </p:spPr>
+          <p:style>
+            <a:lnRef idx="2">
+              <a:schemeClr val="accent1">
+                <a:shade val="50000"/>
+              </a:schemeClr>
+            </a:lnRef>
+            <a:fillRef idx="1">
+              <a:schemeClr val="accent1"/>
+            </a:fillRef>
+            <a:effectRef idx="0">
+              <a:schemeClr val="accent1"/>
+            </a:effectRef>
+            <a:fontRef idx="minor">
+              <a:schemeClr val="lt1"/>
+            </a:fontRef>
+          </p:style>
+          <p:txBody>
+            <a:bodyPr rtlCol="0" anchor="ctr"/>
+            <a:lstStyle/>
+            <a:p>
+              <a:pPr algn="ctr"/>
+              <a:endParaRPr lang="de-DE"/>
+            </a:p>
+          </p:txBody>
+        </p:sp>
+      </p:grpSp>
+    </p:spTree>
+    <p:extLst>
+      <p:ext uri="{BB962C8B-B14F-4D97-AF65-F5344CB8AC3E}">
+        <p14:creationId xmlns:p14="http://schemas.microsoft.com/office/powerpoint/2010/main" val="2893076849"/>
+      </p:ext>
+    </p:extLst>
+  </p:cSld>
+  <p:clrMapOvr>
+    <a:masterClrMapping/>
+  </p:clrMapOvr>
+</p:sld>
+</file>
+
 <file path=ppt/theme/theme1.xml><?xml version="1.0" encoding="utf-8"?>
 <a:theme xmlns:a="http://schemas.openxmlformats.org/drawingml/2006/main" name="Office">
   <a:themeElements>

</xml_diff>